<commit_message>
updated ppt updated readme file updated jsoniq file
</commit_message>
<xml_diff>
--- a/Documents/[MastersProject]J2MConverter.pptx
+++ b/Documents/[MastersProject]J2MConverter.pptx
@@ -236,7 +236,7 @@
           <a:p>
             <a:fld id="{C17F2C1D-F243-42AB-ADF2-E7CB4E04900E}" type="datetimeFigureOut">
               <a:rPr lang="en-US" smtClean="0"/>
-              <a:t>4/8/2023</a:t>
+              <a:t>4/18/2023</a:t>
             </a:fld>
             <a:endParaRPr lang="en-US"/>
           </a:p>
@@ -413,7 +413,7 @@
           <a:p>
             <a:fld id="{020CE34E-5667-4A32-A6BA-10C7A552BC63}" type="datetimeFigureOut">
               <a:rPr lang="en-US" smtClean="0"/>
-              <a:t>4/8/2023</a:t>
+              <a:t>4/18/2023</a:t>
             </a:fld>
             <a:endParaRPr lang="en-US"/>
           </a:p>
@@ -724,7 +724,10 @@
           <a:bodyPr/>
           <a:lstStyle/>
           <a:p>
-            <a:endParaRPr lang="en-US" dirty="0"/>
+            <a:r>
+              <a:rPr lang="en-US" dirty="0"/>
+              <a:t>J2M: A JSONiq to MongoDB Converter</a:t>
+            </a:r>
           </a:p>
         </p:txBody>
       </p:sp>
@@ -14754,7 +14757,29 @@
               </a:rPr>
               <a:t>pbaba1@student.gsu.edu</a:t>
             </a:r>
-            <a:endParaRPr lang="en-US" i="1" dirty="0"/>
+            <a:br>
+              <a:rPr lang="en-US" sz="1400" i="1" dirty="0"/>
+            </a:br>
+            <a:r>
+              <a:rPr lang="en-US" sz="1400" i="1" dirty="0">
+                <a:solidFill>
+                  <a:srgbClr val="0066FF"/>
+                </a:solidFill>
+                <a:hlinkClick r:id="rId3">
+                  <a:extLst>
+                    <a:ext uri="{A12FA001-AC4F-418D-AE19-62706E023703}">
+                      <ahyp:hlinkClr xmlns:ahyp="http://schemas.microsoft.com/office/drawing/2018/hyperlinkcolor" val="tx"/>
+                    </a:ext>
+                  </a:extLst>
+                </a:hlinkClick>
+              </a:rPr>
+              <a:t>Website</a:t>
+            </a:r>
+            <a:endParaRPr lang="en-US" sz="1400" i="1" dirty="0">
+              <a:solidFill>
+                <a:srgbClr val="0066FF"/>
+              </a:solidFill>
+            </a:endParaRPr>
           </a:p>
           <a:p>
             <a:r>
@@ -14766,7 +14791,7 @@
             </a:br>
             <a:r>
               <a:rPr lang="en-US" sz="1400" i="1" dirty="0">
-                <a:hlinkClick r:id="rId3"/>
+                <a:hlinkClick r:id="rId4"/>
               </a:rPr>
               <a:t>rajsunderraman@gsu.edu</a:t>
             </a:r>
@@ -14775,7 +14800,7 @@
             </a:br>
             <a:r>
               <a:rPr lang="en-US" sz="1400" i="1" dirty="0">
-                <a:hlinkClick r:id="rId4"/>
+                <a:hlinkClick r:id="rId5"/>
               </a:rPr>
               <a:t>Website</a:t>
             </a:r>
@@ -14803,7 +14828,7 @@
           </p:nvPr>
         </p:nvPicPr>
         <p:blipFill rotWithShape="1">
-          <a:blip r:embed="rId5" cstate="screen">
+          <a:blip r:embed="rId6" cstate="screen">
             <a:extLst>
               <a:ext uri="{28A0092B-C50C-407E-A947-70E740481C1C}">
                 <a14:useLocalDpi xmlns:a14="http://schemas.microsoft.com/office/drawing/2010/main" val="0"/>
@@ -14837,7 +14862,7 @@
           </p:nvPr>
         </p:nvPicPr>
         <p:blipFill rotWithShape="1">
-          <a:blip r:embed="rId6" cstate="screen">
+          <a:blip r:embed="rId7" cstate="screen">
             <a:extLst>
               <a:ext uri="{28A0092B-C50C-407E-A947-70E740481C1C}">
                 <a14:useLocalDpi xmlns:a14="http://schemas.microsoft.com/office/drawing/2010/main" val="0"/>
@@ -14881,7 +14906,11 @@
           <a:lstStyle/>
           <a:p>
             <a:r>
-              <a:rPr lang="en-US" dirty="0"/>
+              <a:rPr lang="en-US" dirty="0">
+                <a:solidFill>
+                  <a:srgbClr val="D1D2D7"/>
+                </a:solidFill>
+              </a:rPr>
               <a:t>Thursday, April 20, 2023</a:t>
             </a:r>
           </a:p>
@@ -14914,7 +14943,11 @@
           <a:lstStyle/>
           <a:p>
             <a:r>
-              <a:rPr lang="en-US" dirty="0"/>
+              <a:rPr lang="en-US" dirty="0">
+                <a:solidFill>
+                  <a:srgbClr val="D1D2D7"/>
+                </a:solidFill>
+              </a:rPr>
               <a:t>J2M Converter</a:t>
             </a:r>
           </a:p>
@@ -14947,11 +14980,19 @@
           <a:lstStyle/>
           <a:p>
             <a:fld id="{DBA1B0FB-D917-4C8C-928F-313BD683BF39}" type="slidenum">
-              <a:rPr lang="en-US" smtClean="0"/>
+              <a:rPr lang="en-US" smtClean="0">
+                <a:solidFill>
+                  <a:srgbClr val="D1D2D7"/>
+                </a:solidFill>
+              </a:rPr>
               <a:pPr/>
               <a:t>11</a:t>
             </a:fld>
-            <a:endParaRPr lang="en-US"/>
+            <a:endParaRPr lang="en-US">
+              <a:solidFill>
+                <a:srgbClr val="D1D2D7"/>
+              </a:solidFill>
+            </a:endParaRPr>
           </a:p>
         </p:txBody>
       </p:sp>
@@ -15004,7 +15045,7 @@
         <p:spPr>
           <a:xfrm>
             <a:off x="550862" y="196900"/>
-            <a:ext cx="3565524" cy="1997855"/>
+            <a:ext cx="3448558" cy="1613239"/>
           </a:xfrm>
         </p:spPr>
         <p:txBody>
@@ -15036,7 +15077,7 @@
         </p:nvSpPr>
         <p:spPr>
           <a:xfrm>
-            <a:off x="550862" y="2360751"/>
+            <a:off x="550862" y="1985681"/>
             <a:ext cx="3565525" cy="3415519"/>
           </a:xfrm>
         </p:spPr>
@@ -15071,6 +15112,12 @@
             <a:r>
               <a:rPr lang="en-US" dirty="0"/>
               <a:t>Conclusion</a:t>
+            </a:r>
+          </a:p>
+          <a:p>
+            <a:r>
+              <a:rPr lang="en-US" dirty="0"/>
+              <a:t>Future Work</a:t>
             </a:r>
           </a:p>
           <a:p>
@@ -15213,7 +15260,11 @@
           <a:lstStyle/>
           <a:p>
             <a:r>
-              <a:rPr lang="en-US" dirty="0"/>
+              <a:rPr lang="en-US" dirty="0">
+                <a:solidFill>
+                  <a:srgbClr val="D1D2D7"/>
+                </a:solidFill>
+              </a:rPr>
               <a:t>Thursday, April 20, 2023</a:t>
             </a:r>
           </a:p>
@@ -15246,7 +15297,11 @@
           <a:lstStyle/>
           <a:p>
             <a:r>
-              <a:rPr lang="en-US" dirty="0"/>
+              <a:rPr lang="en-US" dirty="0">
+                <a:solidFill>
+                  <a:srgbClr val="D1D2D7"/>
+                </a:solidFill>
+              </a:rPr>
               <a:t>J2M Converter</a:t>
             </a:r>
           </a:p>
@@ -15279,11 +15334,19 @@
           <a:lstStyle/>
           <a:p>
             <a:fld id="{DBA1B0FB-D917-4C8C-928F-313BD683BF39}" type="slidenum">
-              <a:rPr lang="en-US" smtClean="0"/>
+              <a:rPr lang="en-US" smtClean="0">
+                <a:solidFill>
+                  <a:srgbClr val="D1D2D7"/>
+                </a:solidFill>
+              </a:rPr>
               <a:pPr/>
               <a:t>2</a:t>
             </a:fld>
-            <a:endParaRPr lang="en-US"/>
+            <a:endParaRPr lang="en-US">
+              <a:solidFill>
+                <a:srgbClr val="D1D2D7"/>
+              </a:solidFill>
+            </a:endParaRPr>
           </a:p>
         </p:txBody>
       </p:sp>
@@ -22525,7 +22588,7 @@
         </p:blipFill>
         <p:spPr>
           <a:xfrm>
-            <a:off x="0" y="-47625"/>
+            <a:off x="0" y="-66286"/>
             <a:ext cx="12192000" cy="6858000"/>
           </a:xfrm>
         </p:spPr>
@@ -22796,8 +22859,14 @@
           <a:lstStyle/>
           <a:p>
             <a:r>
-              <a:rPr lang="en-US"/>
-              <a:t>Tuesday, February 2, 20XX</a:t>
+              <a:rPr lang="en-US" dirty="0">
+                <a:solidFill>
+                  <a:schemeClr val="tx1">
+                    <a:alpha val="80000"/>
+                  </a:schemeClr>
+                </a:solidFill>
+              </a:rPr>
+              <a:t>Thursday, April 20, 2023</a:t>
             </a:r>
           </a:p>
         </p:txBody>
@@ -22823,9 +22892,23 @@
           <a:bodyPr/>
           <a:lstStyle/>
           <a:p>
+            <a:pPr>
+              <a:spcAft>
+                <a:spcPts val="600"/>
+              </a:spcAft>
+            </a:pPr>
             <a:r>
-              <a:rPr lang="en-US"/>
-              <a:t>Sample Footer Text</a:t>
+              <a:rPr lang="en-US" kern="1200" dirty="0">
+                <a:solidFill>
+                  <a:schemeClr val="tx1">
+                    <a:alpha val="80000"/>
+                  </a:schemeClr>
+                </a:solidFill>
+                <a:latin typeface="+mn-lt"/>
+                <a:ea typeface="+mn-ea"/>
+                <a:cs typeface="+mn-cs"/>
+              </a:rPr>
+              <a:t>J2M Converter</a:t>
             </a:r>
           </a:p>
         </p:txBody>
@@ -23837,9 +23920,7 @@
             <a:fld id="{DBA1B0FB-D917-4C8C-928F-313BD683BF39}" type="slidenum">
               <a:rPr lang="en-US" smtClean="0">
                 <a:solidFill>
-                  <a:schemeClr val="tx1">
-                    <a:alpha val="80000"/>
-                  </a:schemeClr>
+                  <a:srgbClr val="D1D2D7"/>
                 </a:solidFill>
               </a:rPr>
               <a:pPr>
@@ -23849,11 +23930,9 @@
               </a:pPr>
               <a:t>8</a:t>
             </a:fld>
-            <a:endParaRPr lang="en-US">
+            <a:endParaRPr lang="en-US" dirty="0">
               <a:solidFill>
-                <a:schemeClr val="tx1">
-                  <a:alpha val="80000"/>
-                </a:schemeClr>
+                <a:srgbClr val="D1D2D7"/>
               </a:solidFill>
             </a:endParaRPr>
           </a:p>
@@ -24855,7 +24934,7 @@
         </p:spPr>
         <p:txBody>
           <a:bodyPr vert="horz" wrap="square" lIns="0" tIns="0" rIns="0" bIns="0" rtlCol="0">
-            <a:normAutofit/>
+            <a:normAutofit lnSpcReduction="10000"/>
           </a:bodyPr>
           <a:lstStyle/>
           <a:p>
@@ -24981,6 +25060,33 @@
               <a:rPr lang="en-US" sz="2400" dirty="0"/>
               <a:t>ace for interaction</a:t>
             </a:r>
+          </a:p>
+          <a:p>
+            <a:pPr marL="342900" indent="-342900">
+              <a:lnSpc>
+                <a:spcPct val="100000"/>
+              </a:lnSpc>
+              <a:buFont typeface="Arial" panose="020B0604020202020204" pitchFamily="34" charset="0"/>
+              <a:buChar char="•"/>
+            </a:pPr>
+            <a:r>
+              <a:rPr lang="en-US" sz="2400" dirty="0"/>
+              <a:t>Code customization to work with other JSON database systems – </a:t>
+            </a:r>
+            <a:r>
+              <a:rPr lang="en-US" i="1" dirty="0"/>
+              <a:t>e.g., CouchDB and other NoSQL systems</a:t>
+            </a:r>
+            <a:endParaRPr lang="en-US" sz="2400" i="1" dirty="0"/>
+          </a:p>
+          <a:p>
+            <a:pPr marL="342900" indent="-342900">
+              <a:lnSpc>
+                <a:spcPct val="100000"/>
+              </a:lnSpc>
+              <a:buFont typeface="Arial" panose="020B0604020202020204" pitchFamily="34" charset="0"/>
+              <a:buChar char="•"/>
+            </a:pPr>
             <a:endParaRPr lang="en-US" sz="2400" kern="1200" dirty="0">
               <a:latin typeface="+mn-lt"/>
               <a:ea typeface="+mn-ea"/>
@@ -26445,6 +26551,34 @@
 </file>
 
 <file path=customXml/item1.xml><?xml version="1.0" encoding="utf-8"?>
+<?mso-contentType ?>
+<FormTemplates xmlns="http://schemas.microsoft.com/sharepoint/v3/contenttype/forms">
+  <Display>DocumentLibraryForm</Display>
+  <Edit>DocumentLibraryForm</Edit>
+  <New>DocumentLibraryForm</New>
+</FormTemplates>
+</file>
+
+<file path=customXml/item2.xml><?xml version="1.0" encoding="utf-8"?>
+<p:properties xmlns:p="http://schemas.microsoft.com/office/2006/metadata/properties" xmlns:xsi="http://www.w3.org/2001/XMLSchema-instance" xmlns:pc="http://schemas.microsoft.com/office/infopath/2007/PartnerControls">
+  <documentManagement>
+    <_ip_UnifiedCompliancePolicyUIAction xmlns="http://schemas.microsoft.com/sharepoint/v3" xsi:nil="true"/>
+    <Image xmlns="71af3243-3dd4-4a8d-8c0d-dd76da1f02a5">
+      <Url xsi:nil="true"/>
+      <Description xsi:nil="true"/>
+    </Image>
+    <Status xmlns="71af3243-3dd4-4a8d-8c0d-dd76da1f02a5">Not started</Status>
+    <_ip_UnifiedCompliancePolicyProperties xmlns="http://schemas.microsoft.com/sharepoint/v3" xsi:nil="true"/>
+    <lcf76f155ced4ddcb4097134ff3c332f xmlns="71af3243-3dd4-4a8d-8c0d-dd76da1f02a5">
+      <Terms xmlns="http://schemas.microsoft.com/office/infopath/2007/PartnerControls"/>
+    </lcf76f155ced4ddcb4097134ff3c332f>
+    <TaxCatchAll xmlns="230e9df3-be65-4c73-a93b-d1236ebd677e"/>
+    <MediaServiceKeyPoints xmlns="71af3243-3dd4-4a8d-8c0d-dd76da1f02a5" xsi:nil="true"/>
+  </documentManagement>
+</p:properties>
+</file>
+
+<file path=customXml/item3.xml><?xml version="1.0" encoding="utf-8"?>
 <ct:contentTypeSchema xmlns:ct="http://schemas.microsoft.com/office/2006/metadata/contentType" xmlns:ma="http://schemas.microsoft.com/office/2006/metadata/properties/metaAttributes" ct:_="" ma:_="" ma:contentTypeName="Document" ma:contentTypeID="0x01010079F111ED35F8CC479449609E8A0923A6" ma:contentTypeVersion="18" ma:contentTypeDescription="Create a new document." ma:contentTypeScope="" ma:versionID="22a266b9fa9a230c5a512669d8b298c3">
   <xsd:schema xmlns:xsd="http://www.w3.org/2001/XMLSchema" xmlns:xs="http://www.w3.org/2001/XMLSchema" xmlns:p="http://schemas.microsoft.com/office/2006/metadata/properties" xmlns:ns1="http://schemas.microsoft.com/sharepoint/v3" xmlns:ns2="71af3243-3dd4-4a8d-8c0d-dd76da1f02a5" xmlns:ns3="16c05727-aa75-4e4a-9b5f-8a80a1165891" xmlns:ns4="230e9df3-be65-4c73-a93b-d1236ebd677e" targetNamespace="http://schemas.microsoft.com/office/2006/metadata/properties" ma:root="true" ma:fieldsID="eddc33fff6b14141ee5c74a0d29ea6a1" ns1:_="" ns2:_="" ns3:_="" ns4:_="">
     <xsd:import namespace="http://schemas.microsoft.com/sharepoint/v3"/>
@@ -26720,35 +26854,27 @@
 </ct:contentTypeSchema>
 </file>
 
-<file path=customXml/item2.xml><?xml version="1.0" encoding="utf-8"?>
-<p:properties xmlns:p="http://schemas.microsoft.com/office/2006/metadata/properties" xmlns:xsi="http://www.w3.org/2001/XMLSchema-instance" xmlns:pc="http://schemas.microsoft.com/office/infopath/2007/PartnerControls">
-  <documentManagement>
-    <_ip_UnifiedCompliancePolicyUIAction xmlns="http://schemas.microsoft.com/sharepoint/v3" xsi:nil="true"/>
-    <Image xmlns="71af3243-3dd4-4a8d-8c0d-dd76da1f02a5">
-      <Url xsi:nil="true"/>
-      <Description xsi:nil="true"/>
-    </Image>
-    <Status xmlns="71af3243-3dd4-4a8d-8c0d-dd76da1f02a5">Not started</Status>
-    <_ip_UnifiedCompliancePolicyProperties xmlns="http://schemas.microsoft.com/sharepoint/v3" xsi:nil="true"/>
-    <lcf76f155ced4ddcb4097134ff3c332f xmlns="71af3243-3dd4-4a8d-8c0d-dd76da1f02a5">
-      <Terms xmlns="http://schemas.microsoft.com/office/infopath/2007/PartnerControls"/>
-    </lcf76f155ced4ddcb4097134ff3c332f>
-    <TaxCatchAll xmlns="230e9df3-be65-4c73-a93b-d1236ebd677e"/>
-    <MediaServiceKeyPoints xmlns="71af3243-3dd4-4a8d-8c0d-dd76da1f02a5" xsi:nil="true"/>
-  </documentManagement>
-</p:properties>
+<file path=customXml/itemProps1.xml><?xml version="1.0" encoding="utf-8"?>
+<ds:datastoreItem xmlns:ds="http://schemas.openxmlformats.org/officeDocument/2006/customXml" ds:itemID="{904751AB-E840-446F-8D49-E697067EC887}">
+  <ds:schemaRefs>
+    <ds:schemaRef ds:uri="http://schemas.microsoft.com/sharepoint/v3/contenttype/forms"/>
+  </ds:schemaRefs>
+</ds:datastoreItem>
 </file>
 
-<file path=customXml/item3.xml><?xml version="1.0" encoding="utf-8"?>
-<?mso-contentType ?>
-<FormTemplates xmlns="http://schemas.microsoft.com/sharepoint/v3/contenttype/forms">
-  <Display>DocumentLibraryForm</Display>
-  <Edit>DocumentLibraryForm</Edit>
-  <New>DocumentLibraryForm</New>
-</FormTemplates>
+<file path=customXml/itemProps2.xml><?xml version="1.0" encoding="utf-8"?>
+<ds:datastoreItem xmlns:ds="http://schemas.openxmlformats.org/officeDocument/2006/customXml" ds:itemID="{50811A92-D464-4AC4-A396-BA73B10CEEAC}">
+  <ds:schemaRefs>
+    <ds:schemaRef ds:uri="http://schemas.microsoft.com/office/2006/metadata/properties"/>
+    <ds:schemaRef ds:uri="http://schemas.microsoft.com/office/infopath/2007/PartnerControls"/>
+    <ds:schemaRef ds:uri="http://schemas.microsoft.com/sharepoint/v3"/>
+    <ds:schemaRef ds:uri="71af3243-3dd4-4a8d-8c0d-dd76da1f02a5"/>
+    <ds:schemaRef ds:uri="230e9df3-be65-4c73-a93b-d1236ebd677e"/>
+  </ds:schemaRefs>
+</ds:datastoreItem>
 </file>
 
-<file path=customXml/itemProps1.xml><?xml version="1.0" encoding="utf-8"?>
+<file path=customXml/itemProps3.xml><?xml version="1.0" encoding="utf-8"?>
 <ds:datastoreItem xmlns:ds="http://schemas.openxmlformats.org/officeDocument/2006/customXml" ds:itemID="{DE4876F9-7AE1-498D-B8FE-1E3AD703D2AF}">
   <ds:schemaRefs>
     <ds:schemaRef ds:uri="http://schemas.microsoft.com/office/2006/metadata/contentType"/>
@@ -26769,26 +26895,6 @@
 </ds:datastoreItem>
 </file>
 
-<file path=customXml/itemProps2.xml><?xml version="1.0" encoding="utf-8"?>
-<ds:datastoreItem xmlns:ds="http://schemas.openxmlformats.org/officeDocument/2006/customXml" ds:itemID="{50811A92-D464-4AC4-A396-BA73B10CEEAC}">
-  <ds:schemaRefs>
-    <ds:schemaRef ds:uri="http://schemas.microsoft.com/office/2006/metadata/properties"/>
-    <ds:schemaRef ds:uri="http://schemas.microsoft.com/office/infopath/2007/PartnerControls"/>
-    <ds:schemaRef ds:uri="http://schemas.microsoft.com/sharepoint/v3"/>
-    <ds:schemaRef ds:uri="71af3243-3dd4-4a8d-8c0d-dd76da1f02a5"/>
-    <ds:schemaRef ds:uri="230e9df3-be65-4c73-a93b-d1236ebd677e"/>
-  </ds:schemaRefs>
-</ds:datastoreItem>
-</file>
-
-<file path=customXml/itemProps3.xml><?xml version="1.0" encoding="utf-8"?>
-<ds:datastoreItem xmlns:ds="http://schemas.openxmlformats.org/officeDocument/2006/customXml" ds:itemID="{904751AB-E840-446F-8D49-E697067EC887}">
-  <ds:schemaRefs>
-    <ds:schemaRef ds:uri="http://schemas.microsoft.com/sharepoint/v3/contenttype/forms"/>
-  </ds:schemaRefs>
-</ds:datastoreItem>
-</file>
-
 <file path=docMetadata/LabelInfo.xml><?xml version="1.0" encoding="utf-8"?>
 <clbl:labelList xmlns:clbl="http://schemas.microsoft.com/office/2020/mipLabelMetadata">
   <clbl:label id="{f42aa342-8706-4288-bd11-ebb85995028c}" enabled="1" method="Standard" siteId="{72f988bf-86f1-41af-91ab-2d7cd011db47}" contentBits="0" removed="0"/>

</xml_diff>

<commit_message>
updated ppt, deleted unwanted files
</commit_message>
<xml_diff>
--- a/Documents/[MastersProject]J2MConverter.pptx
+++ b/Documents/[MastersProject]J2MConverter.pptx
@@ -236,7 +236,7 @@
           <a:p>
             <a:fld id="{C17F2C1D-F243-42AB-ADF2-E7CB4E04900E}" type="datetimeFigureOut">
               <a:rPr lang="en-US" smtClean="0"/>
-              <a:t>4/18/2023</a:t>
+              <a:t>4/19/2023</a:t>
             </a:fld>
             <a:endParaRPr lang="en-US"/>
           </a:p>
@@ -413,7 +413,7 @@
           <a:p>
             <a:fld id="{020CE34E-5667-4A32-A6BA-10C7A552BC63}" type="datetimeFigureOut">
               <a:rPr lang="en-US" smtClean="0"/>
-              <a:t>4/18/2023</a:t>
+              <a:t>4/19/2023</a:t>
             </a:fld>
             <a:endParaRPr lang="en-US"/>
           </a:p>
@@ -18147,7 +18147,7 @@
         </p:spPr>
         <p:txBody>
           <a:bodyPr vert="horz" wrap="square" lIns="0" tIns="0" rIns="0" bIns="0" rtlCol="0" anchor="t">
-            <a:normAutofit/>
+            <a:normAutofit fontScale="92500" lnSpcReduction="10000"/>
           </a:bodyPr>
           <a:lstStyle>
             <a:lvl1pPr marL="228600" indent="-228600" algn="l" defTabSz="914400" rtl="0" eaLnBrk="1" latinLnBrk="0" hangingPunct="1">
@@ -18342,14 +18342,14 @@
             <a:pPr algn="just"/>
             <a:r>
               <a:rPr lang="en-US" sz="2400" dirty="0"/>
-              <a:t> XQuery-based query language</a:t>
+              <a:t> Query language designed for popular JSON data model</a:t>
             </a:r>
           </a:p>
           <a:p>
             <a:pPr algn="just"/>
             <a:r>
               <a:rPr lang="en-US" sz="2400" dirty="0"/>
-              <a:t>JDM – JSONiq Data Model compatible with multiple JSON-like formats</a:t>
+              <a:t>JDM – JSONiq Data Model compatible with multiple JSON-like formats </a:t>
             </a:r>
           </a:p>
           <a:p>
@@ -18582,7 +18582,7 @@
             <a:pPr algn="just"/>
             <a:r>
               <a:rPr lang="en-US" sz="2400" dirty="0"/>
-              <a:t> Document-oriented NoSQL database</a:t>
+              <a:t> Classified as document-oriented NoSQL database program</a:t>
             </a:r>
           </a:p>
           <a:p>
@@ -19336,6 +19336,14 @@
               <a:rPr lang="en-US" dirty="0"/>
               <a:t>Input query</a:t>
             </a:r>
+            <a:br>
+              <a:rPr lang="en-US" dirty="0"/>
+            </a:br>
+            <a:r>
+              <a:rPr lang="en-US" sz="1400" dirty="0"/>
+              <a:t>(JSONiq)</a:t>
+            </a:r>
+            <a:endParaRPr lang="en-US" dirty="0"/>
           </a:p>
         </p:txBody>
       </p:sp>
@@ -26551,34 +26559,6 @@
 </file>
 
 <file path=customXml/item1.xml><?xml version="1.0" encoding="utf-8"?>
-<?mso-contentType ?>
-<FormTemplates xmlns="http://schemas.microsoft.com/sharepoint/v3/contenttype/forms">
-  <Display>DocumentLibraryForm</Display>
-  <Edit>DocumentLibraryForm</Edit>
-  <New>DocumentLibraryForm</New>
-</FormTemplates>
-</file>
-
-<file path=customXml/item2.xml><?xml version="1.0" encoding="utf-8"?>
-<p:properties xmlns:p="http://schemas.microsoft.com/office/2006/metadata/properties" xmlns:xsi="http://www.w3.org/2001/XMLSchema-instance" xmlns:pc="http://schemas.microsoft.com/office/infopath/2007/PartnerControls">
-  <documentManagement>
-    <_ip_UnifiedCompliancePolicyUIAction xmlns="http://schemas.microsoft.com/sharepoint/v3" xsi:nil="true"/>
-    <Image xmlns="71af3243-3dd4-4a8d-8c0d-dd76da1f02a5">
-      <Url xsi:nil="true"/>
-      <Description xsi:nil="true"/>
-    </Image>
-    <Status xmlns="71af3243-3dd4-4a8d-8c0d-dd76da1f02a5">Not started</Status>
-    <_ip_UnifiedCompliancePolicyProperties xmlns="http://schemas.microsoft.com/sharepoint/v3" xsi:nil="true"/>
-    <lcf76f155ced4ddcb4097134ff3c332f xmlns="71af3243-3dd4-4a8d-8c0d-dd76da1f02a5">
-      <Terms xmlns="http://schemas.microsoft.com/office/infopath/2007/PartnerControls"/>
-    </lcf76f155ced4ddcb4097134ff3c332f>
-    <TaxCatchAll xmlns="230e9df3-be65-4c73-a93b-d1236ebd677e"/>
-    <MediaServiceKeyPoints xmlns="71af3243-3dd4-4a8d-8c0d-dd76da1f02a5" xsi:nil="true"/>
-  </documentManagement>
-</p:properties>
-</file>
-
-<file path=customXml/item3.xml><?xml version="1.0" encoding="utf-8"?>
 <ct:contentTypeSchema xmlns:ct="http://schemas.microsoft.com/office/2006/metadata/contentType" xmlns:ma="http://schemas.microsoft.com/office/2006/metadata/properties/metaAttributes" ct:_="" ma:_="" ma:contentTypeName="Document" ma:contentTypeID="0x01010079F111ED35F8CC479449609E8A0923A6" ma:contentTypeVersion="18" ma:contentTypeDescription="Create a new document." ma:contentTypeScope="" ma:versionID="22a266b9fa9a230c5a512669d8b298c3">
   <xsd:schema xmlns:xsd="http://www.w3.org/2001/XMLSchema" xmlns:xs="http://www.w3.org/2001/XMLSchema" xmlns:p="http://schemas.microsoft.com/office/2006/metadata/properties" xmlns:ns1="http://schemas.microsoft.com/sharepoint/v3" xmlns:ns2="71af3243-3dd4-4a8d-8c0d-dd76da1f02a5" xmlns:ns3="16c05727-aa75-4e4a-9b5f-8a80a1165891" xmlns:ns4="230e9df3-be65-4c73-a93b-d1236ebd677e" targetNamespace="http://schemas.microsoft.com/office/2006/metadata/properties" ma:root="true" ma:fieldsID="eddc33fff6b14141ee5c74a0d29ea6a1" ns1:_="" ns2:_="" ns3:_="" ns4:_="">
     <xsd:import namespace="http://schemas.microsoft.com/sharepoint/v3"/>
@@ -26854,27 +26834,35 @@
 </ct:contentTypeSchema>
 </file>
 
-<file path=customXml/itemProps1.xml><?xml version="1.0" encoding="utf-8"?>
-<ds:datastoreItem xmlns:ds="http://schemas.openxmlformats.org/officeDocument/2006/customXml" ds:itemID="{904751AB-E840-446F-8D49-E697067EC887}">
-  <ds:schemaRefs>
-    <ds:schemaRef ds:uri="http://schemas.microsoft.com/sharepoint/v3/contenttype/forms"/>
-  </ds:schemaRefs>
-</ds:datastoreItem>
+<file path=customXml/item2.xml><?xml version="1.0" encoding="utf-8"?>
+<p:properties xmlns:p="http://schemas.microsoft.com/office/2006/metadata/properties" xmlns:xsi="http://www.w3.org/2001/XMLSchema-instance" xmlns:pc="http://schemas.microsoft.com/office/infopath/2007/PartnerControls">
+  <documentManagement>
+    <_ip_UnifiedCompliancePolicyUIAction xmlns="http://schemas.microsoft.com/sharepoint/v3" xsi:nil="true"/>
+    <Image xmlns="71af3243-3dd4-4a8d-8c0d-dd76da1f02a5">
+      <Url xsi:nil="true"/>
+      <Description xsi:nil="true"/>
+    </Image>
+    <Status xmlns="71af3243-3dd4-4a8d-8c0d-dd76da1f02a5">Not started</Status>
+    <_ip_UnifiedCompliancePolicyProperties xmlns="http://schemas.microsoft.com/sharepoint/v3" xsi:nil="true"/>
+    <lcf76f155ced4ddcb4097134ff3c332f xmlns="71af3243-3dd4-4a8d-8c0d-dd76da1f02a5">
+      <Terms xmlns="http://schemas.microsoft.com/office/infopath/2007/PartnerControls"/>
+    </lcf76f155ced4ddcb4097134ff3c332f>
+    <TaxCatchAll xmlns="230e9df3-be65-4c73-a93b-d1236ebd677e"/>
+    <MediaServiceKeyPoints xmlns="71af3243-3dd4-4a8d-8c0d-dd76da1f02a5" xsi:nil="true"/>
+  </documentManagement>
+</p:properties>
 </file>
 
-<file path=customXml/itemProps2.xml><?xml version="1.0" encoding="utf-8"?>
-<ds:datastoreItem xmlns:ds="http://schemas.openxmlformats.org/officeDocument/2006/customXml" ds:itemID="{50811A92-D464-4AC4-A396-BA73B10CEEAC}">
-  <ds:schemaRefs>
-    <ds:schemaRef ds:uri="http://schemas.microsoft.com/office/2006/metadata/properties"/>
-    <ds:schemaRef ds:uri="http://schemas.microsoft.com/office/infopath/2007/PartnerControls"/>
-    <ds:schemaRef ds:uri="http://schemas.microsoft.com/sharepoint/v3"/>
-    <ds:schemaRef ds:uri="71af3243-3dd4-4a8d-8c0d-dd76da1f02a5"/>
-    <ds:schemaRef ds:uri="230e9df3-be65-4c73-a93b-d1236ebd677e"/>
-  </ds:schemaRefs>
-</ds:datastoreItem>
+<file path=customXml/item3.xml><?xml version="1.0" encoding="utf-8"?>
+<?mso-contentType ?>
+<FormTemplates xmlns="http://schemas.microsoft.com/sharepoint/v3/contenttype/forms">
+  <Display>DocumentLibraryForm</Display>
+  <Edit>DocumentLibraryForm</Edit>
+  <New>DocumentLibraryForm</New>
+</FormTemplates>
 </file>
 
-<file path=customXml/itemProps3.xml><?xml version="1.0" encoding="utf-8"?>
+<file path=customXml/itemProps1.xml><?xml version="1.0" encoding="utf-8"?>
 <ds:datastoreItem xmlns:ds="http://schemas.openxmlformats.org/officeDocument/2006/customXml" ds:itemID="{DE4876F9-7AE1-498D-B8FE-1E3AD703D2AF}">
   <ds:schemaRefs>
     <ds:schemaRef ds:uri="http://schemas.microsoft.com/office/2006/metadata/contentType"/>
@@ -26895,6 +26883,26 @@
 </ds:datastoreItem>
 </file>
 
+<file path=customXml/itemProps2.xml><?xml version="1.0" encoding="utf-8"?>
+<ds:datastoreItem xmlns:ds="http://schemas.openxmlformats.org/officeDocument/2006/customXml" ds:itemID="{50811A92-D464-4AC4-A396-BA73B10CEEAC}">
+  <ds:schemaRefs>
+    <ds:schemaRef ds:uri="http://schemas.microsoft.com/office/2006/metadata/properties"/>
+    <ds:schemaRef ds:uri="http://schemas.microsoft.com/office/infopath/2007/PartnerControls"/>
+    <ds:schemaRef ds:uri="http://schemas.microsoft.com/sharepoint/v3"/>
+    <ds:schemaRef ds:uri="71af3243-3dd4-4a8d-8c0d-dd76da1f02a5"/>
+    <ds:schemaRef ds:uri="230e9df3-be65-4c73-a93b-d1236ebd677e"/>
+  </ds:schemaRefs>
+</ds:datastoreItem>
+</file>
+
+<file path=customXml/itemProps3.xml><?xml version="1.0" encoding="utf-8"?>
+<ds:datastoreItem xmlns:ds="http://schemas.openxmlformats.org/officeDocument/2006/customXml" ds:itemID="{904751AB-E840-446F-8D49-E697067EC887}">
+  <ds:schemaRefs>
+    <ds:schemaRef ds:uri="http://schemas.microsoft.com/sharepoint/v3/contenttype/forms"/>
+  </ds:schemaRefs>
+</ds:datastoreItem>
+</file>
+
 <file path=docMetadata/LabelInfo.xml><?xml version="1.0" encoding="utf-8"?>
 <clbl:labelList xmlns:clbl="http://schemas.microsoft.com/office/2020/mipLabelMetadata">
   <clbl:label id="{f42aa342-8706-4288-bd11-ebb85995028c}" enabled="1" method="Standard" siteId="{72f988bf-86f1-41af-91ab-2d7cd011db47}" contentBits="0" removed="0"/>

</xml_diff>

<commit_message>
updated ppt deleted the parsed extra files
</commit_message>
<xml_diff>
--- a/Documents/[MastersProject]J2MConverter.pptx
+++ b/Documents/[MastersProject]J2MConverter.pptx
@@ -236,7 +236,7 @@
           <a:p>
             <a:fld id="{C17F2C1D-F243-42AB-ADF2-E7CB4E04900E}" type="datetimeFigureOut">
               <a:rPr lang="en-US" smtClean="0"/>
-              <a:t>4/19/2023</a:t>
+              <a:t>4/20/2023</a:t>
             </a:fld>
             <a:endParaRPr lang="en-US"/>
           </a:p>
@@ -413,7 +413,7 @@
           <a:p>
             <a:fld id="{020CE34E-5667-4A32-A6BA-10C7A552BC63}" type="datetimeFigureOut">
               <a:rPr lang="en-US" smtClean="0"/>
-              <a:t>4/19/2023</a:t>
+              <a:t>4/20/2023</a:t>
             </a:fld>
             <a:endParaRPr lang="en-US"/>
           </a:p>
@@ -726,7 +726,23 @@
           <a:p>
             <a:r>
               <a:rPr lang="en-US" dirty="0"/>
-              <a:t>J2M: A JSONiq to MongoDB Converter</a:t>
+              <a:t>Hello </a:t>
+            </a:r>
+            <a:r>
+              <a:rPr lang="en-US" dirty="0" err="1"/>
+              <a:t>Dr.Raj</a:t>
+            </a:r>
+            <a:r>
+              <a:rPr lang="en-US" dirty="0"/>
+              <a:t> and </a:t>
+            </a:r>
+            <a:r>
+              <a:rPr lang="en-US" dirty="0" err="1"/>
+              <a:t>Dr.Shiraj</a:t>
+            </a:r>
+            <a:r>
+              <a:rPr lang="en-US" dirty="0"/>
+              <a:t>. A very good evening to you both. I Pooja Baba, am a Masters student in Computer Science majors graduating in Spring 2023. Today I will be presenting my Masters project J2M: A JSONiq to MongoDB converter, completed under the guidance of Dr. Raj Sunderraman.</a:t>
             </a:r>
           </a:p>
         </p:txBody>
@@ -758,6 +774,90 @@
     <p:extLst>
       <p:ext uri="{BB962C8B-B14F-4D97-AF65-F5344CB8AC3E}">
         <p14:creationId xmlns:p14="http://schemas.microsoft.com/office/powerpoint/2010/main" val="1560835968"/>
+      </p:ext>
+    </p:extLst>
+  </p:cSld>
+  <p:clrMapOvr>
+    <a:masterClrMapping/>
+  </p:clrMapOvr>
+</p:notes>
+</file>
+
+<file path=ppt/notesSlides/notesSlide10.xml><?xml version="1.0" encoding="utf-8"?>
+<p:notes xmlns:a="http://schemas.openxmlformats.org/drawingml/2006/main" xmlns:r="http://schemas.openxmlformats.org/officeDocument/2006/relationships" xmlns:p="http://schemas.openxmlformats.org/presentationml/2006/main">
+  <p:cSld>
+    <p:spTree>
+      <p:nvGrpSpPr>
+        <p:cNvPr id="1" name=""/>
+        <p:cNvGrpSpPr/>
+        <p:nvPr/>
+      </p:nvGrpSpPr>
+      <p:grpSpPr>
+        <a:xfrm>
+          <a:off x="0" y="0"/>
+          <a:ext cx="0" cy="0"/>
+          <a:chOff x="0" y="0"/>
+          <a:chExt cx="0" cy="0"/>
+        </a:xfrm>
+      </p:grpSpPr>
+      <p:sp>
+        <p:nvSpPr>
+          <p:cNvPr id="2" name="Slide Image Placeholder 1"/>
+          <p:cNvSpPr>
+            <a:spLocks noGrp="1" noRot="1" noChangeAspect="1"/>
+          </p:cNvSpPr>
+          <p:nvPr>
+            <p:ph type="sldImg"/>
+          </p:nvPr>
+        </p:nvSpPr>
+        <p:spPr/>
+      </p:sp>
+      <p:sp>
+        <p:nvSpPr>
+          <p:cNvPr id="3" name="Notes Placeholder 2"/>
+          <p:cNvSpPr>
+            <a:spLocks noGrp="1"/>
+          </p:cNvSpPr>
+          <p:nvPr>
+            <p:ph type="body" idx="1"/>
+          </p:nvPr>
+        </p:nvSpPr>
+        <p:spPr/>
+        <p:txBody>
+          <a:bodyPr/>
+          <a:lstStyle/>
+          <a:p>
+            <a:endParaRPr lang="en-US" dirty="0"/>
+          </a:p>
+        </p:txBody>
+      </p:sp>
+      <p:sp>
+        <p:nvSpPr>
+          <p:cNvPr id="4" name="Slide Number Placeholder 3"/>
+          <p:cNvSpPr>
+            <a:spLocks noGrp="1"/>
+          </p:cNvSpPr>
+          <p:nvPr>
+            <p:ph type="sldNum" sz="quarter" idx="5"/>
+          </p:nvPr>
+        </p:nvSpPr>
+        <p:spPr/>
+        <p:txBody>
+          <a:bodyPr/>
+          <a:lstStyle/>
+          <a:p>
+            <a:fld id="{1983A999-5E0E-42CA-8400-604AE921FF7C}" type="slidenum">
+              <a:rPr lang="en-US" smtClean="0"/>
+              <a:t>10</a:t>
+            </a:fld>
+            <a:endParaRPr lang="en-US"/>
+          </a:p>
+        </p:txBody>
+      </p:sp>
+    </p:spTree>
+    <p:extLst>
+      <p:ext uri="{BB962C8B-B14F-4D97-AF65-F5344CB8AC3E}">
+        <p14:creationId xmlns:p14="http://schemas.microsoft.com/office/powerpoint/2010/main" val="2288074959"/>
       </p:ext>
     </p:extLst>
   </p:cSld>
@@ -811,7 +911,10 @@
           <a:bodyPr/>
           <a:lstStyle/>
           <a:p>
-            <a:endParaRPr lang="en-US" dirty="0"/>
+            <a:r>
+              <a:rPr lang="en-US" dirty="0"/>
+              <a:t>So as we proceed, we will be going through the following agenda. Starting with what was the motivation to this project, how that led us to formulate the problem statement. Discussing about the implementation model, quick demo of the project built, conclusion, future work and the references.</a:t>
+            </a:r>
           </a:p>
         </p:txBody>
       </p:sp>
@@ -830,9 +933,9 @@
           <a:bodyPr/>
           <a:lstStyle/>
           <a:p>
-            <a:fld id="{1983A999-5E0E-42CA-8400-604AE921FF7C}" type="slidenum">
+            <a:fld id="{E7CCE34D-CFF1-4FFE-815B-D050E7ED2DFD}" type="slidenum">
               <a:rPr lang="en-US" smtClean="0"/>
-              <a:t>3</a:t>
+              <a:t>2</a:t>
             </a:fld>
             <a:endParaRPr lang="en-US"/>
           </a:p>
@@ -841,7 +944,7 @@
     </p:spTree>
     <p:extLst>
       <p:ext uri="{BB962C8B-B14F-4D97-AF65-F5344CB8AC3E}">
-        <p14:creationId xmlns:p14="http://schemas.microsoft.com/office/powerpoint/2010/main" val="2100331255"/>
+        <p14:creationId xmlns:p14="http://schemas.microsoft.com/office/powerpoint/2010/main" val="1561738857"/>
       </p:ext>
     </p:extLst>
   </p:cSld>
@@ -895,7 +998,10 @@
           <a:bodyPr/>
           <a:lstStyle/>
           <a:p>
-            <a:endParaRPr lang="en-US" dirty="0"/>
+            <a:r>
+              <a:rPr lang="en-US" dirty="0"/>
+              <a:t>In today's world where data plays a key role, we know that it has become difficult to implement the structured databases for every use cases. Hence the concept of NoSQL has been built to deal with data that can be unstructured. And with unstructured data, JSON has become the most popular element of modern database. This is because of the ease and the efficiency of the data access. Having JSON as the foundation various databases and query languages have been created.</a:t>
+            </a:r>
           </a:p>
         </p:txBody>
       </p:sp>
@@ -916,7 +1022,7 @@
           <a:p>
             <a:fld id="{1983A999-5E0E-42CA-8400-604AE921FF7C}" type="slidenum">
               <a:rPr lang="en-US" smtClean="0"/>
-              <a:t>4</a:t>
+              <a:t>3</a:t>
             </a:fld>
             <a:endParaRPr lang="en-US"/>
           </a:p>
@@ -925,7 +1031,7 @@
     </p:spTree>
     <p:extLst>
       <p:ext uri="{BB962C8B-B14F-4D97-AF65-F5344CB8AC3E}">
-        <p14:creationId xmlns:p14="http://schemas.microsoft.com/office/powerpoint/2010/main" val="2041227502"/>
+        <p14:creationId xmlns:p14="http://schemas.microsoft.com/office/powerpoint/2010/main" val="2100331255"/>
       </p:ext>
     </p:extLst>
   </p:cSld>
@@ -979,7 +1085,26 @@
           <a:bodyPr/>
           <a:lstStyle/>
           <a:p>
-            <a:endParaRPr lang="en-US" dirty="0"/>
+            <a:r>
+              <a:rPr lang="en-US" dirty="0"/>
+              <a:t>These various tools, databases and query languages have their own </a:t>
+            </a:r>
+            <a:r>
+              <a:rPr lang="en-US" dirty="0" err="1"/>
+              <a:t>sytax</a:t>
+            </a:r>
+            <a:r>
+              <a:rPr lang="en-US" dirty="0"/>
+              <a:t> that one needs to keep in mind or learn. For an individual it becomes a bit difficult and confusing to master all at once. Hence, an idea popped to design and develop a system that can convert a query language for JSON from one form to another and query an actual database and fetch results for the user. Leading to designing a system that uses JSONiq to query from a MongoDB. Here we know that JSONiq itself is a different query language that uses a different syntax all together and can be only </a:t>
+            </a:r>
+            <a:r>
+              <a:rPr lang="en-US" dirty="0" err="1"/>
+              <a:t>queryed</a:t>
+            </a:r>
+            <a:r>
+              <a:rPr lang="en-US" dirty="0"/>
+              <a:t> on JSON file/ JSON content. But since MongoDB has all JSON base, we decided to build a system that can bring data from the MongoDB using JSONiq query language.</a:t>
+            </a:r>
           </a:p>
         </p:txBody>
       </p:sp>
@@ -1000,7 +1125,7 @@
           <a:p>
             <a:fld id="{1983A999-5E0E-42CA-8400-604AE921FF7C}" type="slidenum">
               <a:rPr lang="en-US" smtClean="0"/>
-              <a:t>5</a:t>
+              <a:t>4</a:t>
             </a:fld>
             <a:endParaRPr lang="en-US"/>
           </a:p>
@@ -1009,7 +1134,7 @@
     </p:spTree>
     <p:extLst>
       <p:ext uri="{BB962C8B-B14F-4D97-AF65-F5344CB8AC3E}">
-        <p14:creationId xmlns:p14="http://schemas.microsoft.com/office/powerpoint/2010/main" val="2225154526"/>
+        <p14:creationId xmlns:p14="http://schemas.microsoft.com/office/powerpoint/2010/main" val="2041227502"/>
       </p:ext>
     </p:extLst>
   </p:cSld>
@@ -1063,6 +1188,12 @@
           <a:bodyPr/>
           <a:lstStyle/>
           <a:p>
+            <a:r>
+              <a:rPr lang="en-US" dirty="0"/>
+              <a:t>Since I have been talking about JSONiq  and MongoDB for quite some time, I would like to talk now about the basics of both. Starting with JSONiq - it is a query language specifically designed for the popular JSON data model. The main ideas of JSONiq are based on the lessons learnt from the relational query systems and semi-structured data experience. This query language can do all the operations similar to SQL like - select/project, filter, join, group, order. This is commonly known as FLOWR for JSONiq. There is JDM i.e., JSONiq Data Model involved with multiple JSON-like formats that include - text, csv, parquet. And any JSONiq value is a sequence of items where an item can be an atomic value, an object, an array or a function called dynamically. Coming to MongoDB, it is classified as a document-oriented NoSQL database program. Though MongoDB has data storage in BSON format, the underlying concept is JSON. It uses JSON-like documents with optional schema. The query language used is MQL - MongoDB query language.</a:t>
+            </a:r>
+          </a:p>
+          <a:p>
             <a:endParaRPr lang="en-US" dirty="0"/>
           </a:p>
         </p:txBody>
@@ -1084,7 +1215,7 @@
           <a:p>
             <a:fld id="{1983A999-5E0E-42CA-8400-604AE921FF7C}" type="slidenum">
               <a:rPr lang="en-US" smtClean="0"/>
-              <a:t>6</a:t>
+              <a:t>5</a:t>
             </a:fld>
             <a:endParaRPr lang="en-US"/>
           </a:p>
@@ -1093,7 +1224,7 @@
     </p:spTree>
     <p:extLst>
       <p:ext uri="{BB962C8B-B14F-4D97-AF65-F5344CB8AC3E}">
-        <p14:creationId xmlns:p14="http://schemas.microsoft.com/office/powerpoint/2010/main" val="731175088"/>
+        <p14:creationId xmlns:p14="http://schemas.microsoft.com/office/powerpoint/2010/main" val="2225154526"/>
       </p:ext>
     </p:extLst>
   </p:cSld>
@@ -1168,7 +1299,7 @@
           <a:p>
             <a:fld id="{1983A999-5E0E-42CA-8400-604AE921FF7C}" type="slidenum">
               <a:rPr lang="en-US" smtClean="0"/>
-              <a:t>7</a:t>
+              <a:t>6</a:t>
             </a:fld>
             <a:endParaRPr lang="en-US"/>
           </a:p>
@@ -1177,7 +1308,7 @@
     </p:spTree>
     <p:extLst>
       <p:ext uri="{BB962C8B-B14F-4D97-AF65-F5344CB8AC3E}">
-        <p14:creationId xmlns:p14="http://schemas.microsoft.com/office/powerpoint/2010/main" val="1586550175"/>
+        <p14:creationId xmlns:p14="http://schemas.microsoft.com/office/powerpoint/2010/main" val="731175088"/>
       </p:ext>
     </p:extLst>
   </p:cSld>
@@ -1252,7 +1383,7 @@
           <a:p>
             <a:fld id="{1983A999-5E0E-42CA-8400-604AE921FF7C}" type="slidenum">
               <a:rPr lang="en-US" smtClean="0"/>
-              <a:t>8</a:t>
+              <a:t>7</a:t>
             </a:fld>
             <a:endParaRPr lang="en-US"/>
           </a:p>
@@ -1261,7 +1392,7 @@
     </p:spTree>
     <p:extLst>
       <p:ext uri="{BB962C8B-B14F-4D97-AF65-F5344CB8AC3E}">
-        <p14:creationId xmlns:p14="http://schemas.microsoft.com/office/powerpoint/2010/main" val="4150892672"/>
+        <p14:creationId xmlns:p14="http://schemas.microsoft.com/office/powerpoint/2010/main" val="1586550175"/>
       </p:ext>
     </p:extLst>
   </p:cSld>
@@ -1317,6 +1448,17 @@
           <a:p>
             <a:endParaRPr lang="en-US" dirty="0"/>
           </a:p>
+          <a:p>
+            <a:r>
+              <a:rPr lang="en-US" dirty="0"/>
+              <a:t>Hence with the system designed and built so far, we are able to bridge the gap between JSONiq query language and MongoDB. </a:t>
+            </a:r>
+            <a:r>
+              <a:rPr lang="en-US"/>
+              <a:t>With this there is no extra cost/overhead of learning MongoDB query language to query MongoDB.</a:t>
+            </a:r>
+            <a:endParaRPr lang="en-US" dirty="0"/>
+          </a:p>
         </p:txBody>
       </p:sp>
       <p:sp>
@@ -1336,7 +1478,7 @@
           <a:p>
             <a:fld id="{1983A999-5E0E-42CA-8400-604AE921FF7C}" type="slidenum">
               <a:rPr lang="en-US" smtClean="0"/>
-              <a:t>9</a:t>
+              <a:t>8</a:t>
             </a:fld>
             <a:endParaRPr lang="en-US"/>
           </a:p>
@@ -1345,7 +1487,7 @@
     </p:spTree>
     <p:extLst>
       <p:ext uri="{BB962C8B-B14F-4D97-AF65-F5344CB8AC3E}">
-        <p14:creationId xmlns:p14="http://schemas.microsoft.com/office/powerpoint/2010/main" val="3228808448"/>
+        <p14:creationId xmlns:p14="http://schemas.microsoft.com/office/powerpoint/2010/main" val="4150892672"/>
       </p:ext>
     </p:extLst>
   </p:cSld>
@@ -1420,7 +1562,7 @@
           <a:p>
             <a:fld id="{1983A999-5E0E-42CA-8400-604AE921FF7C}" type="slidenum">
               <a:rPr lang="en-US" smtClean="0"/>
-              <a:t>10</a:t>
+              <a:t>9</a:t>
             </a:fld>
             <a:endParaRPr lang="en-US"/>
           </a:p>
@@ -1429,7 +1571,7 @@
     </p:spTree>
     <p:extLst>
       <p:ext uri="{BB962C8B-B14F-4D97-AF65-F5344CB8AC3E}">
-        <p14:creationId xmlns:p14="http://schemas.microsoft.com/office/powerpoint/2010/main" val="2288074959"/>
+        <p14:creationId xmlns:p14="http://schemas.microsoft.com/office/powerpoint/2010/main" val="3228808448"/>
       </p:ext>
     </p:extLst>
   </p:cSld>
@@ -15148,7 +15290,7 @@
           </p:nvPr>
         </p:nvPicPr>
         <p:blipFill rotWithShape="1">
-          <a:blip r:embed="rId2" cstate="screen">
+          <a:blip r:embed="rId3" cstate="screen">
             <a:extLst>
               <a:ext uri="{28A0092B-C50C-407E-A947-70E740481C1C}">
                 <a14:useLocalDpi xmlns:a14="http://schemas.microsoft.com/office/drawing/2010/main" val="0"/>
@@ -15182,7 +15324,7 @@
           </p:nvPr>
         </p:nvPicPr>
         <p:blipFill rotWithShape="1">
-          <a:blip r:embed="rId3" cstate="screen">
+          <a:blip r:embed="rId4" cstate="screen">
             <a:extLst>
               <a:ext uri="{28A0092B-C50C-407E-A947-70E740481C1C}">
                 <a14:useLocalDpi xmlns:a14="http://schemas.microsoft.com/office/drawing/2010/main" val="0"/>
@@ -15216,7 +15358,7 @@
           </p:nvPr>
         </p:nvPicPr>
         <p:blipFill rotWithShape="1">
-          <a:blip r:embed="rId4" cstate="screen">
+          <a:blip r:embed="rId5" cstate="screen">
             <a:extLst>
               <a:ext uri="{28A0092B-C50C-407E-A947-70E740481C1C}">
                 <a14:useLocalDpi xmlns:a14="http://schemas.microsoft.com/office/drawing/2010/main" val="0"/>
@@ -22596,7 +22738,7 @@
         </p:blipFill>
         <p:spPr>
           <a:xfrm>
-            <a:off x="0" y="-66286"/>
+            <a:off x="0" y="-75616"/>
             <a:ext cx="12192000" cy="6858000"/>
           </a:xfrm>
         </p:spPr>
@@ -22771,7 +22913,7 @@
         </p:nvSpPr>
         <p:spPr>
           <a:xfrm>
-            <a:off x="550863" y="549275"/>
+            <a:off x="461169" y="923697"/>
             <a:ext cx="5437187" cy="2986234"/>
           </a:xfrm>
         </p:spPr>
@@ -22796,51 +22938,6 @@
                 <a:cs typeface="+mj-cs"/>
               </a:rPr>
               <a:t>Demo</a:t>
-            </a:r>
-          </a:p>
-        </p:txBody>
-      </p:sp>
-      <p:sp>
-        <p:nvSpPr>
-          <p:cNvPr id="16" name="Subtitle 15">
-            <a:extLst>
-              <a:ext uri="{FF2B5EF4-FFF2-40B4-BE49-F238E27FC236}">
-                <a16:creationId xmlns:a16="http://schemas.microsoft.com/office/drawing/2014/main" id="{4BDCF583-1D5D-4235-97C2-39272B80A0B1}"/>
-              </a:ext>
-            </a:extLst>
-          </p:cNvPr>
-          <p:cNvSpPr>
-            <a:spLocks noGrp="1"/>
-          </p:cNvSpPr>
-          <p:nvPr>
-            <p:ph type="subTitle" idx="1"/>
-          </p:nvPr>
-        </p:nvSpPr>
-        <p:spPr>
-          <a:xfrm>
-            <a:off x="550863" y="3827610"/>
-            <a:ext cx="5437187" cy="2265216"/>
-          </a:xfrm>
-        </p:spPr>
-        <p:txBody>
-          <a:bodyPr vert="horz" wrap="square" lIns="0" tIns="0" rIns="0" bIns="0" rtlCol="0">
-            <a:normAutofit/>
-          </a:bodyPr>
-          <a:lstStyle/>
-          <a:p>
-            <a:pPr marL="0" indent="0">
-              <a:lnSpc>
-                <a:spcPct val="100000"/>
-              </a:lnSpc>
-              <a:buNone/>
-            </a:pPr>
-            <a:r>
-              <a:rPr lang="en-US" kern="1200" dirty="0">
-                <a:latin typeface="+mn-lt"/>
-                <a:ea typeface="+mn-ea"/>
-                <a:cs typeface="+mn-cs"/>
-              </a:rPr>
-              <a:t>Subtitle</a:t>
             </a:r>
           </a:p>
         </p:txBody>
@@ -22939,14 +23036,38 @@
         </p:nvSpPr>
         <p:spPr/>
         <p:txBody>
-          <a:bodyPr/>
+          <a:bodyPr vert="horz" wrap="square" lIns="0" tIns="0" rIns="0" bIns="0" rtlCol="0" anchor="ctr">
+            <a:spAutoFit/>
+          </a:bodyPr>
           <a:lstStyle/>
           <a:p>
+            <a:pPr>
+              <a:spcAft>
+                <a:spcPts val="600"/>
+              </a:spcAft>
+            </a:pPr>
             <a:fld id="{DBA1B0FB-D917-4C8C-928F-313BD683BF39}" type="slidenum">
-              <a:rPr lang="en-US" smtClean="0"/>
+              <a:rPr lang="en-US">
+                <a:solidFill>
+                  <a:schemeClr val="tx1">
+                    <a:alpha val="80000"/>
+                  </a:schemeClr>
+                </a:solidFill>
+              </a:rPr>
+              <a:pPr>
+                <a:spcAft>
+                  <a:spcPts val="600"/>
+                </a:spcAft>
+              </a:pPr>
               <a:t>7</a:t>
             </a:fld>
-            <a:endParaRPr lang="en-US"/>
+            <a:endParaRPr lang="en-US" dirty="0">
+              <a:solidFill>
+                <a:schemeClr val="tx1">
+                  <a:alpha val="80000"/>
+                </a:schemeClr>
+              </a:solidFill>
+            </a:endParaRPr>
           </a:p>
         </p:txBody>
       </p:sp>

</xml_diff>